<commit_message>
clean up slide deck
</commit_message>
<xml_diff>
--- a/presentation/predicting_bank_telemarketing_sales.pptx
+++ b/presentation/predicting_bank_telemarketing_sales.pptx
@@ -12,6 +12,9 @@
     <p:sldId id="312" r:id="rId9"/>
     <p:sldId id="313" r:id="rId10"/>
     <p:sldId id="314" r:id="rId11"/>
+    <p:sldId id="315" r:id="rId12"/>
+    <p:sldId id="316" r:id="rId13"/>
+    <p:sldId id="317" r:id="rId14"/>
   </p:sldIdLst>
   <p:sldSz cx="12192000" cy="6858000"/>
   <p:notesSz cx="6858000" cy="9144000"/>
@@ -6864,6 +6867,107 @@
 </p:sld>
 </file>
 
+<file path=ppt/slides/slide10.xml><?xml version="1.0" encoding="utf-8"?>
+<p:sld xmlns:a="http://schemas.openxmlformats.org/drawingml/2006/main" xmlns:r="http://schemas.openxmlformats.org/officeDocument/2006/relationships" xmlns:p="http://schemas.openxmlformats.org/presentationml/2006/main">
+  <p:cSld>
+    <p:spTree>
+      <p:nvGrpSpPr>
+        <p:cNvPr id="1" name=""/>
+        <p:cNvGrpSpPr/>
+        <p:nvPr/>
+      </p:nvGrpSpPr>
+      <p:grpSpPr>
+        <a:xfrm>
+          <a:off x="0" y="0"/>
+          <a:ext cx="0" cy="0"/>
+          <a:chOff x="0" y="0"/>
+          <a:chExt cx="0" cy="0"/>
+        </a:xfrm>
+      </p:grpSpPr>
+      <p:sp>
+        <p:nvSpPr>
+          <p:cNvPr id="9" name="Title 8">
+            <a:extLst>
+              <a:ext uri="{FF2B5EF4-FFF2-40B4-BE49-F238E27FC236}">
+                <a16:creationId xmlns:a16="http://schemas.microsoft.com/office/drawing/2014/main" id="{BA311747-798A-4106-A555-042873E9C56B}"/>
+              </a:ext>
+            </a:extLst>
+          </p:cNvPr>
+          <p:cNvSpPr>
+            <a:spLocks noGrp="1"/>
+          </p:cNvSpPr>
+          <p:nvPr>
+            <p:ph type="title"/>
+          </p:nvPr>
+        </p:nvSpPr>
+        <p:spPr>
+          <a:xfrm>
+            <a:off x="3951609" y="3430880"/>
+            <a:ext cx="4288783" cy="1586501"/>
+          </a:xfrm>
+        </p:spPr>
+        <p:txBody>
+          <a:bodyPr>
+            <a:normAutofit/>
+          </a:bodyPr>
+          <a:lstStyle/>
+          <a:p>
+            <a:pPr algn="ctr"/>
+            <a:r>
+              <a:rPr lang="en-US" sz="6000" dirty="0"/>
+              <a:t>Thank you!</a:t>
+            </a:r>
+          </a:p>
+        </p:txBody>
+      </p:sp>
+      <p:pic>
+        <p:nvPicPr>
+          <p:cNvPr id="10" name="Graphic 9" descr="Wave Gesture with solid fill">
+            <a:extLst>
+              <a:ext uri="{FF2B5EF4-FFF2-40B4-BE49-F238E27FC236}">
+                <a16:creationId xmlns:a16="http://schemas.microsoft.com/office/drawing/2014/main" id="{B8A9E409-2557-4B45-A077-39A1E76B6872}"/>
+              </a:ext>
+            </a:extLst>
+          </p:cNvPr>
+          <p:cNvPicPr>
+            <a:picLocks noChangeAspect="1"/>
+          </p:cNvPicPr>
+          <p:nvPr/>
+        </p:nvPicPr>
+        <p:blipFill>
+          <a:blip r:embed="rId2">
+            <a:extLst>
+              <a:ext uri="{96DAC541-7B7A-43D3-8B79-37D633B846F1}">
+                <asvg:svgBlip xmlns:asvg="http://schemas.microsoft.com/office/drawing/2016/SVG/main" r:embed="rId3"/>
+              </a:ext>
+            </a:extLst>
+          </a:blip>
+          <a:srcRect/>
+          <a:stretch/>
+        </p:blipFill>
+        <p:spPr>
+          <a:xfrm>
+            <a:off x="5001565" y="1528073"/>
+            <a:ext cx="2188870" cy="2188870"/>
+          </a:xfrm>
+          <a:prstGeom prst="rect">
+            <a:avLst/>
+          </a:prstGeom>
+        </p:spPr>
+      </p:pic>
+    </p:spTree>
+    <p:extLst>
+      <p:ext uri="{BB962C8B-B14F-4D97-AF65-F5344CB8AC3E}">
+        <p14:creationId xmlns:p14="http://schemas.microsoft.com/office/powerpoint/2010/main" val="3503424066"/>
+      </p:ext>
+    </p:extLst>
+  </p:cSld>
+  <p:clrMapOvr>
+    <a:masterClrMapping/>
+  </p:clrMapOvr>
+</p:sld>
+</file>
+
 <file path=ppt/slides/slide2.xml><?xml version="1.0" encoding="utf-8"?>
 <p:sld xmlns:a="http://schemas.openxmlformats.org/drawingml/2006/main" xmlns:r="http://schemas.openxmlformats.org/officeDocument/2006/relationships" xmlns:p="http://schemas.openxmlformats.org/presentationml/2006/main">
   <p:cSld>
@@ -7982,19 +8086,19 @@
         </p:nvSpPr>
         <p:spPr>
           <a:xfrm>
-            <a:off x="557720" y="612843"/>
-            <a:ext cx="2312480" cy="945691"/>
+            <a:off x="570960" y="543340"/>
+            <a:ext cx="2312480" cy="1452516"/>
           </a:xfrm>
         </p:spPr>
         <p:txBody>
           <a:bodyPr vert="horz" lIns="91440" tIns="45720" rIns="91440" bIns="45720" rtlCol="0" anchor="b">
-            <a:normAutofit/>
+            <a:normAutofit fontScale="90000"/>
           </a:bodyPr>
           <a:lstStyle/>
           <a:p>
             <a:r>
               <a:rPr lang="en-US" sz="2800" dirty="0"/>
-              <a:t>Employment Count</a:t>
+              <a:t>Push Hard When Employment is Low</a:t>
             </a:r>
           </a:p>
         </p:txBody>
@@ -8017,13 +8121,13 @@
         </p:nvSpPr>
         <p:spPr>
           <a:xfrm>
-            <a:off x="570960" y="1699783"/>
+            <a:off x="552334" y="2133016"/>
             <a:ext cx="2312479" cy="3719973"/>
           </a:xfrm>
         </p:spPr>
         <p:txBody>
           <a:bodyPr vert="horz" lIns="91440" tIns="45720" rIns="91440" bIns="45720" rtlCol="0">
-            <a:normAutofit/>
+            <a:normAutofit fontScale="85000" lnSpcReduction="20000"/>
           </a:bodyPr>
           <a:lstStyle/>
           <a:p>
@@ -8096,6 +8200,122 @@
                 </a:solidFill>
               </a:rPr>
               <a:t>What is the conversion rate for unemployed people?</a:t>
+            </a:r>
+          </a:p>
+          <a:p>
+            <a:pPr>
+              <a:lnSpc>
+                <a:spcPct val="100000"/>
+              </a:lnSpc>
+            </a:pPr>
+            <a:endParaRPr lang="en-US" sz="1400" dirty="0">
+              <a:solidFill>
+                <a:schemeClr val="tx1">
+                  <a:lumMod val="85000"/>
+                  <a:lumOff val="15000"/>
+                </a:schemeClr>
+              </a:solidFill>
+            </a:endParaRPr>
+          </a:p>
+          <a:p>
+            <a:pPr marL="0" indent="0">
+              <a:lnSpc>
+                <a:spcPct val="100000"/>
+              </a:lnSpc>
+              <a:buNone/>
+            </a:pPr>
+            <a:r>
+              <a:rPr lang="en-US" sz="1400" b="1" dirty="0">
+                <a:solidFill>
+                  <a:schemeClr val="tx1">
+                    <a:lumMod val="85000"/>
+                    <a:lumOff val="15000"/>
+                  </a:schemeClr>
+                </a:solidFill>
+              </a:rPr>
+              <a:t>Recommendation</a:t>
+            </a:r>
+            <a:r>
+              <a:rPr lang="en-US" sz="1400" dirty="0">
+                <a:solidFill>
+                  <a:schemeClr val="tx1">
+                    <a:lumMod val="85000"/>
+                    <a:lumOff val="15000"/>
+                  </a:schemeClr>
+                </a:solidFill>
+              </a:rPr>
+              <a:t>:</a:t>
+            </a:r>
+          </a:p>
+          <a:p>
+            <a:pPr marL="0" indent="0">
+              <a:lnSpc>
+                <a:spcPct val="100000"/>
+              </a:lnSpc>
+              <a:buNone/>
+            </a:pPr>
+            <a:r>
+              <a:rPr lang="en-US" sz="1400" dirty="0">
+                <a:solidFill>
+                  <a:schemeClr val="tx1">
+                    <a:lumMod val="85000"/>
+                    <a:lumOff val="15000"/>
+                  </a:schemeClr>
+                </a:solidFill>
+              </a:rPr>
+              <a:t>Pump resources into marketing when employment is </a:t>
+            </a:r>
+            <a:r>
+              <a:rPr lang="en-US" sz="1400" b="1" dirty="0">
+                <a:solidFill>
+                  <a:schemeClr val="tx1">
+                    <a:lumMod val="85000"/>
+                    <a:lumOff val="15000"/>
+                  </a:schemeClr>
+                </a:solidFill>
+              </a:rPr>
+              <a:t>low.</a:t>
+            </a:r>
+          </a:p>
+          <a:p>
+            <a:pPr marL="0" indent="0">
+              <a:lnSpc>
+                <a:spcPct val="100000"/>
+              </a:lnSpc>
+              <a:buNone/>
+            </a:pPr>
+            <a:r>
+              <a:rPr lang="en-US" sz="1400" dirty="0">
+                <a:solidFill>
+                  <a:schemeClr val="tx1">
+                    <a:lumMod val="85000"/>
+                    <a:lumOff val="15000"/>
+                  </a:schemeClr>
+                </a:solidFill>
+              </a:rPr>
+              <a:t>Relax your efforts when employment is </a:t>
+            </a:r>
+            <a:r>
+              <a:rPr lang="en-US" sz="1400" b="1" dirty="0">
+                <a:solidFill>
+                  <a:schemeClr val="tx1">
+                    <a:lumMod val="85000"/>
+                    <a:lumOff val="15000"/>
+                  </a:schemeClr>
+                </a:solidFill>
+              </a:rPr>
+              <a:t>high</a:t>
+            </a:r>
+            <a:r>
+              <a:rPr lang="en-US" sz="1400" dirty="0">
+                <a:solidFill>
+                  <a:schemeClr val="tx1">
+                    <a:lumMod val="85000"/>
+                    <a:lumOff val="15000"/>
+                  </a:schemeClr>
+                </a:solidFill>
+              </a:rPr>
+              <a:t>.</a:t>
             </a:r>
           </a:p>
         </p:txBody>
@@ -8668,13 +8888,13 @@
         </p:spPr>
         <p:txBody>
           <a:bodyPr vert="horz" lIns="91440" tIns="45720" rIns="91440" bIns="45720" rtlCol="0" anchor="ctr">
-            <a:normAutofit/>
+            <a:noAutofit/>
           </a:bodyPr>
           <a:lstStyle/>
           <a:p>
             <a:r>
-              <a:rPr lang="en-US" sz="4400" dirty="0"/>
-              <a:t>Conversion Rate and Sales by Job</a:t>
+              <a:rPr lang="en-US" dirty="0"/>
+              <a:t>Unemployed People Don’t Invest</a:t>
             </a:r>
           </a:p>
         </p:txBody>
@@ -8713,8 +8933,8 @@
               </a:lnSpc>
             </a:pPr>
             <a:r>
-              <a:rPr lang="en-US" dirty="0"/>
-              <a:t>The conversion rate for unemployed people is surprisingly high, but not that high</a:t>
+              <a:rPr lang="en-US" sz="1600" dirty="0"/>
+              <a:t>The conversion rate for the unemployed is surprisingly high, but not that high</a:t>
             </a:r>
           </a:p>
           <a:p>
@@ -8724,7 +8944,7 @@
               </a:lnSpc>
             </a:pPr>
             <a:r>
-              <a:rPr lang="en-US" dirty="0"/>
+              <a:rPr lang="en-US" sz="1600" dirty="0"/>
               <a:t>The total sales to unemployed people is predictably low</a:t>
             </a:r>
           </a:p>
@@ -8735,7 +8955,7 @@
               </a:lnSpc>
             </a:pPr>
             <a:r>
-              <a:rPr lang="en-US" dirty="0"/>
+              <a:rPr lang="en-US" sz="1600" dirty="0"/>
               <a:t>Students and retirees have the highest average conversion rate</a:t>
             </a:r>
           </a:p>
@@ -8746,7 +8966,7 @@
               </a:lnSpc>
             </a:pPr>
             <a:r>
-              <a:rPr lang="en-US" dirty="0"/>
+              <a:rPr lang="en-US" sz="1600" dirty="0"/>
               <a:t>Administrators and technicians have the highest total sales</a:t>
             </a:r>
           </a:p>
@@ -8766,6 +8986,1302 @@
 </file>
 
 <file path=ppt/slides/slide7.xml><?xml version="1.0" encoding="utf-8"?>
+<p:sld xmlns:a="http://schemas.openxmlformats.org/drawingml/2006/main" xmlns:r="http://schemas.openxmlformats.org/officeDocument/2006/relationships" xmlns:p="http://schemas.openxmlformats.org/presentationml/2006/main">
+  <p:cSld>
+    <p:bg>
+      <p:bgPr>
+        <a:solidFill>
+          <a:schemeClr val="bg1"/>
+        </a:solidFill>
+        <a:effectLst/>
+      </p:bgPr>
+    </p:bg>
+    <p:spTree>
+      <p:nvGrpSpPr>
+        <p:cNvPr id="1" name=""/>
+        <p:cNvGrpSpPr/>
+        <p:nvPr/>
+      </p:nvGrpSpPr>
+      <p:grpSpPr>
+        <a:xfrm>
+          <a:off x="0" y="0"/>
+          <a:ext cx="0" cy="0"/>
+          <a:chOff x="0" y="0"/>
+          <a:chExt cx="0" cy="0"/>
+        </a:xfrm>
+      </p:grpSpPr>
+      <p:sp useBgFill="1">
+        <p:nvSpPr>
+          <p:cNvPr id="41" name="Rectangle 40">
+            <a:extLst>
+              <a:ext uri="{FF2B5EF4-FFF2-40B4-BE49-F238E27FC236}">
+                <a16:creationId xmlns:a16="http://schemas.microsoft.com/office/drawing/2014/main" id="{1E94681D-2A4C-4A8D-B9B5-31D440D0328D}"/>
+              </a:ext>
+              <a:ext uri="{C183D7F6-B498-43B3-948B-1728B52AA6E4}">
+                <adec:decorative xmlns:adec="http://schemas.microsoft.com/office/drawing/2017/decorative" val="1"/>
+              </a:ext>
+            </a:extLst>
+          </p:cNvPr>
+          <p:cNvSpPr>
+            <a:spLocks noGrp="1" noRot="1" noChangeAspect="1" noMove="1" noResize="1" noEditPoints="1" noAdjustHandles="1" noChangeArrowheads="1" noChangeShapeType="1" noTextEdit="1"/>
+          </p:cNvSpPr>
+          <p:nvPr>
+            <p:extLst>
+              <p:ext uri="{386F3935-93C4-4BCD-93E2-E3B085C9AB24}">
+                <p16:designElem xmlns:p16="http://schemas.microsoft.com/office/powerpoint/2015/main" val="1"/>
+              </p:ext>
+            </p:extLst>
+          </p:nvPr>
+        </p:nvSpPr>
+        <p:spPr>
+          <a:xfrm>
+            <a:off x="0" y="0"/>
+            <a:ext cx="12192000" cy="6858000"/>
+          </a:xfrm>
+          <a:prstGeom prst="rect">
+            <a:avLst/>
+          </a:prstGeom>
+          <a:ln>
+            <a:noFill/>
+          </a:ln>
+        </p:spPr>
+        <p:style>
+          <a:lnRef idx="2">
+            <a:schemeClr val="accent1">
+              <a:shade val="50000"/>
+            </a:schemeClr>
+          </a:lnRef>
+          <a:fillRef idx="1">
+            <a:schemeClr val="accent1"/>
+          </a:fillRef>
+          <a:effectRef idx="0">
+            <a:schemeClr val="accent1"/>
+          </a:effectRef>
+          <a:fontRef idx="minor">
+            <a:schemeClr val="lt1"/>
+          </a:fontRef>
+        </p:style>
+        <p:txBody>
+          <a:bodyPr rtlCol="0" anchor="ctr"/>
+          <a:lstStyle/>
+          <a:p>
+            <a:pPr algn="ctr"/>
+            <a:endParaRPr lang="en-US"/>
+          </a:p>
+        </p:txBody>
+      </p:sp>
+      <p:sp>
+        <p:nvSpPr>
+          <p:cNvPr id="43" name="Rectangle 42">
+            <a:extLst>
+              <a:ext uri="{FF2B5EF4-FFF2-40B4-BE49-F238E27FC236}">
+                <a16:creationId xmlns:a16="http://schemas.microsoft.com/office/drawing/2014/main" id="{7CBCD26A-BD2E-4E94-A8F8-A4B67923FDFA}"/>
+              </a:ext>
+              <a:ext uri="{C183D7F6-B498-43B3-948B-1728B52AA6E4}">
+                <adec:decorative xmlns:adec="http://schemas.microsoft.com/office/drawing/2017/decorative" val="1"/>
+              </a:ext>
+            </a:extLst>
+          </p:cNvPr>
+          <p:cNvSpPr>
+            <a:spLocks noGrp="1" noRot="1" noChangeAspect="1" noMove="1" noResize="1" noEditPoints="1" noAdjustHandles="1" noChangeArrowheads="1" noChangeShapeType="1" noTextEdit="1"/>
+          </p:cNvSpPr>
+          <p:nvPr>
+            <p:extLst>
+              <p:ext uri="{386F3935-93C4-4BCD-93E2-E3B085C9AB24}">
+                <p16:designElem xmlns:p16="http://schemas.microsoft.com/office/powerpoint/2015/main" val="1"/>
+              </p:ext>
+            </p:extLst>
+          </p:nvPr>
+        </p:nvSpPr>
+        <p:spPr>
+          <a:xfrm>
+            <a:off x="234696" y="237744"/>
+            <a:ext cx="11722608" cy="6382512"/>
+          </a:xfrm>
+          <a:prstGeom prst="rect">
+            <a:avLst/>
+          </a:prstGeom>
+          <a:solidFill>
+            <a:schemeClr val="bg1">
+              <a:lumMod val="75000"/>
+              <a:alpha val="60000"/>
+            </a:schemeClr>
+          </a:solidFill>
+          <a:ln w="6350" cap="flat" cmpd="sng" algn="ctr">
+            <a:noFill/>
+            <a:prstDash val="solid"/>
+          </a:ln>
+          <a:effectLst>
+            <a:softEdge rad="0"/>
+          </a:effectLst>
+        </p:spPr>
+      </p:sp>
+      <p:sp>
+        <p:nvSpPr>
+          <p:cNvPr id="45" name="Rectangle 44">
+            <a:extLst>
+              <a:ext uri="{FF2B5EF4-FFF2-40B4-BE49-F238E27FC236}">
+                <a16:creationId xmlns:a16="http://schemas.microsoft.com/office/drawing/2014/main" id="{ED0D337F-FB00-4E19-BBDA-8485C8ABB506}"/>
+              </a:ext>
+              <a:ext uri="{C183D7F6-B498-43B3-948B-1728B52AA6E4}">
+                <adec:decorative xmlns:adec="http://schemas.microsoft.com/office/drawing/2017/decorative" val="1"/>
+              </a:ext>
+            </a:extLst>
+          </p:cNvPr>
+          <p:cNvSpPr>
+            <a:spLocks noGrp="1" noRot="1" noChangeAspect="1" noMove="1" noResize="1" noEditPoints="1" noAdjustHandles="1" noChangeArrowheads="1" noChangeShapeType="1" noTextEdit="1"/>
+          </p:cNvSpPr>
+          <p:nvPr>
+            <p:extLst>
+              <p:ext uri="{386F3935-93C4-4BCD-93E2-E3B085C9AB24}">
+                <p16:designElem xmlns:p16="http://schemas.microsoft.com/office/powerpoint/2015/main" val="1"/>
+              </p:ext>
+            </p:extLst>
+          </p:nvPr>
+        </p:nvSpPr>
+        <p:spPr>
+          <a:xfrm>
+            <a:off x="371856" y="374904"/>
+            <a:ext cx="11448288" cy="6108192"/>
+          </a:xfrm>
+          <a:prstGeom prst="rect">
+            <a:avLst/>
+          </a:prstGeom>
+          <a:noFill/>
+          <a:ln w="6350" cap="sq" cmpd="sng" algn="ctr">
+            <a:solidFill>
+              <a:schemeClr val="tx1">
+                <a:lumMod val="85000"/>
+                <a:lumOff val="15000"/>
+              </a:schemeClr>
+            </a:solidFill>
+            <a:prstDash val="solid"/>
+            <a:miter lim="800000"/>
+          </a:ln>
+          <a:effectLst/>
+        </p:spPr>
+      </p:sp>
+      <p:sp useBgFill="1">
+        <p:nvSpPr>
+          <p:cNvPr id="47" name="Rectangle 46">
+            <a:extLst>
+              <a:ext uri="{FF2B5EF4-FFF2-40B4-BE49-F238E27FC236}">
+                <a16:creationId xmlns:a16="http://schemas.microsoft.com/office/drawing/2014/main" id="{78632963-757B-40C2-BB84-FC6107A54DAD}"/>
+              </a:ext>
+              <a:ext uri="{C183D7F6-B498-43B3-948B-1728B52AA6E4}">
+                <adec:decorative xmlns:adec="http://schemas.microsoft.com/office/drawing/2017/decorative" val="1"/>
+              </a:ext>
+            </a:extLst>
+          </p:cNvPr>
+          <p:cNvSpPr>
+            <a:spLocks noGrp="1" noRot="1" noChangeAspect="1" noMove="1" noResize="1" noEditPoints="1" noAdjustHandles="1" noChangeArrowheads="1" noChangeShapeType="1" noTextEdit="1"/>
+          </p:cNvSpPr>
+          <p:nvPr>
+            <p:extLst>
+              <p:ext uri="{386F3935-93C4-4BCD-93E2-E3B085C9AB24}">
+                <p16:designElem xmlns:p16="http://schemas.microsoft.com/office/powerpoint/2015/main" val="1"/>
+              </p:ext>
+            </p:extLst>
+          </p:nvPr>
+        </p:nvSpPr>
+        <p:spPr>
+          <a:xfrm>
+            <a:off x="-1866" y="0"/>
+            <a:ext cx="12193866" cy="6858000"/>
+          </a:xfrm>
+          <a:prstGeom prst="rect">
+            <a:avLst/>
+          </a:prstGeom>
+          <a:ln>
+            <a:noFill/>
+          </a:ln>
+        </p:spPr>
+        <p:style>
+          <a:lnRef idx="2">
+            <a:schemeClr val="accent1">
+              <a:shade val="50000"/>
+            </a:schemeClr>
+          </a:lnRef>
+          <a:fillRef idx="1">
+            <a:schemeClr val="accent1"/>
+          </a:fillRef>
+          <a:effectRef idx="0">
+            <a:schemeClr val="accent1"/>
+          </a:effectRef>
+          <a:fontRef idx="minor">
+            <a:schemeClr val="lt1"/>
+          </a:fontRef>
+        </p:style>
+        <p:txBody>
+          <a:bodyPr rtlCol="0" anchor="ctr"/>
+          <a:lstStyle/>
+          <a:p>
+            <a:pPr algn="ctr"/>
+            <a:endParaRPr lang="en-US" dirty="0"/>
+          </a:p>
+        </p:txBody>
+      </p:sp>
+      <p:sp>
+        <p:nvSpPr>
+          <p:cNvPr id="49" name="Rectangle 48">
+            <a:extLst>
+              <a:ext uri="{FF2B5EF4-FFF2-40B4-BE49-F238E27FC236}">
+                <a16:creationId xmlns:a16="http://schemas.microsoft.com/office/drawing/2014/main" id="{2853AE55-7E35-44B0-89F1-3F52B262AF33}"/>
+              </a:ext>
+              <a:ext uri="{C183D7F6-B498-43B3-948B-1728B52AA6E4}">
+                <adec:decorative xmlns:adec="http://schemas.microsoft.com/office/drawing/2017/decorative" val="1"/>
+              </a:ext>
+            </a:extLst>
+          </p:cNvPr>
+          <p:cNvSpPr>
+            <a:spLocks noGrp="1" noRot="1" noChangeAspect="1" noMove="1" noResize="1" noEditPoints="1" noAdjustHandles="1" noChangeArrowheads="1" noChangeShapeType="1" noTextEdit="1"/>
+          </p:cNvSpPr>
+          <p:nvPr>
+            <p:extLst>
+              <p:ext uri="{386F3935-93C4-4BCD-93E2-E3B085C9AB24}">
+                <p16:designElem xmlns:p16="http://schemas.microsoft.com/office/powerpoint/2015/main" val="1"/>
+              </p:ext>
+            </p:extLst>
+          </p:nvPr>
+        </p:nvSpPr>
+        <p:spPr>
+          <a:xfrm>
+            <a:off x="6339709" y="253548"/>
+            <a:ext cx="5612193" cy="6361598"/>
+          </a:xfrm>
+          <a:prstGeom prst="rect">
+            <a:avLst/>
+          </a:prstGeom>
+          <a:solidFill>
+            <a:schemeClr val="bg1">
+              <a:lumMod val="75000"/>
+              <a:alpha val="60000"/>
+            </a:schemeClr>
+          </a:solidFill>
+          <a:ln>
+            <a:noFill/>
+          </a:ln>
+        </p:spPr>
+        <p:style>
+          <a:lnRef idx="2">
+            <a:schemeClr val="accent1">
+              <a:shade val="50000"/>
+            </a:schemeClr>
+          </a:lnRef>
+          <a:fillRef idx="1">
+            <a:schemeClr val="accent1"/>
+          </a:fillRef>
+          <a:effectRef idx="0">
+            <a:schemeClr val="accent1"/>
+          </a:effectRef>
+          <a:fontRef idx="minor">
+            <a:schemeClr val="lt1"/>
+          </a:fontRef>
+        </p:style>
+        <p:txBody>
+          <a:bodyPr rtlCol="0" anchor="ctr"/>
+          <a:lstStyle/>
+          <a:p>
+            <a:pPr algn="ctr"/>
+            <a:endParaRPr lang="en-US"/>
+          </a:p>
+        </p:txBody>
+      </p:sp>
+      <p:sp>
+        <p:nvSpPr>
+          <p:cNvPr id="51" name="Rectangle 50">
+            <a:extLst>
+              <a:ext uri="{FF2B5EF4-FFF2-40B4-BE49-F238E27FC236}">
+                <a16:creationId xmlns:a16="http://schemas.microsoft.com/office/drawing/2014/main" id="{DBC4BE4D-4B50-4F51-9F85-4B5D60B02D81}"/>
+              </a:ext>
+              <a:ext uri="{C183D7F6-B498-43B3-948B-1728B52AA6E4}">
+                <adec:decorative xmlns:adec="http://schemas.microsoft.com/office/drawing/2017/decorative" val="1"/>
+              </a:ext>
+            </a:extLst>
+          </p:cNvPr>
+          <p:cNvSpPr>
+            <a:spLocks noGrp="1" noRot="1" noChangeAspect="1" noMove="1" noResize="1" noEditPoints="1" noAdjustHandles="1" noChangeArrowheads="1" noChangeShapeType="1" noTextEdit="1"/>
+          </p:cNvSpPr>
+          <p:nvPr>
+            <p:extLst>
+              <p:ext uri="{386F3935-93C4-4BCD-93E2-E3B085C9AB24}">
+                <p16:designElem xmlns:p16="http://schemas.microsoft.com/office/powerpoint/2015/main" val="1"/>
+              </p:ext>
+            </p:extLst>
+          </p:nvPr>
+        </p:nvSpPr>
+        <p:spPr>
+          <a:xfrm>
+            <a:off x="6487542" y="407588"/>
+            <a:ext cx="5299768" cy="6022878"/>
+          </a:xfrm>
+          <a:prstGeom prst="rect">
+            <a:avLst/>
+          </a:prstGeom>
+          <a:noFill/>
+          <a:ln w="6350">
+            <a:solidFill>
+              <a:schemeClr val="tx1">
+                <a:lumMod val="75000"/>
+                <a:lumOff val="25000"/>
+              </a:schemeClr>
+            </a:solidFill>
+          </a:ln>
+        </p:spPr>
+        <p:style>
+          <a:lnRef idx="2">
+            <a:schemeClr val="accent1">
+              <a:shade val="50000"/>
+            </a:schemeClr>
+          </a:lnRef>
+          <a:fillRef idx="1">
+            <a:schemeClr val="accent1"/>
+          </a:fillRef>
+          <a:effectRef idx="0">
+            <a:schemeClr val="accent1"/>
+          </a:effectRef>
+          <a:fontRef idx="minor">
+            <a:schemeClr val="lt1"/>
+          </a:fontRef>
+        </p:style>
+        <p:txBody>
+          <a:bodyPr rtlCol="0" anchor="ctr"/>
+          <a:lstStyle/>
+          <a:p>
+            <a:pPr algn="ctr"/>
+            <a:endParaRPr lang="en-US"/>
+          </a:p>
+        </p:txBody>
+      </p:sp>
+      <p:sp>
+        <p:nvSpPr>
+          <p:cNvPr id="2" name="Title 1">
+            <a:extLst>
+              <a:ext uri="{FF2B5EF4-FFF2-40B4-BE49-F238E27FC236}">
+                <a16:creationId xmlns:a16="http://schemas.microsoft.com/office/drawing/2014/main" id="{D1377214-098C-43FD-85FB-541E1A269C81}"/>
+              </a:ext>
+            </a:extLst>
+          </p:cNvPr>
+          <p:cNvSpPr>
+            <a:spLocks noGrp="1"/>
+          </p:cNvSpPr>
+          <p:nvPr>
+            <p:ph type="title"/>
+          </p:nvPr>
+        </p:nvSpPr>
+        <p:spPr>
+          <a:xfrm>
+            <a:off x="6846137" y="804073"/>
+            <a:ext cx="4602152" cy="1345449"/>
+          </a:xfrm>
+        </p:spPr>
+        <p:txBody>
+          <a:bodyPr vert="horz" lIns="91440" tIns="45720" rIns="91440" bIns="45720" rtlCol="0" anchor="ctr">
+            <a:normAutofit/>
+          </a:bodyPr>
+          <a:lstStyle/>
+          <a:p>
+            <a:r>
+              <a:rPr lang="en-US" sz="3700"/>
+              <a:t>Previous Success is a Major Predictor</a:t>
+            </a:r>
+          </a:p>
+        </p:txBody>
+      </p:sp>
+      <p:pic>
+        <p:nvPicPr>
+          <p:cNvPr id="21" name="Graphic 20">
+            <a:extLst>
+              <a:ext uri="{FF2B5EF4-FFF2-40B4-BE49-F238E27FC236}">
+                <a16:creationId xmlns:a16="http://schemas.microsoft.com/office/drawing/2014/main" id="{59AF7B45-6BF6-40D7-9D2B-2C2550B33D06}"/>
+              </a:ext>
+            </a:extLst>
+          </p:cNvPr>
+          <p:cNvPicPr>
+            <a:picLocks noChangeAspect="1"/>
+          </p:cNvPicPr>
+          <p:nvPr/>
+        </p:nvPicPr>
+        <p:blipFill>
+          <a:blip r:embed="rId2">
+            <a:extLst>
+              <a:ext uri="{96DAC541-7B7A-43D3-8B79-37D633B846F1}">
+                <asvg:svgBlip xmlns:asvg="http://schemas.microsoft.com/office/drawing/2016/SVG/main" r:embed="rId3"/>
+              </a:ext>
+            </a:extLst>
+          </a:blip>
+          <a:stretch>
+            <a:fillRect/>
+          </a:stretch>
+        </p:blipFill>
+        <p:spPr>
+          <a:xfrm>
+            <a:off x="466533" y="715226"/>
+            <a:ext cx="5299770" cy="2592338"/>
+          </a:xfrm>
+          <a:prstGeom prst="rect">
+            <a:avLst/>
+          </a:prstGeom>
+        </p:spPr>
+      </p:pic>
+      <p:pic>
+        <p:nvPicPr>
+          <p:cNvPr id="13" name="Content Placeholder 12">
+            <a:extLst>
+              <a:ext uri="{FF2B5EF4-FFF2-40B4-BE49-F238E27FC236}">
+                <a16:creationId xmlns:a16="http://schemas.microsoft.com/office/drawing/2014/main" id="{A05A26F0-4C3C-4458-BBEA-4F8B1CD63AB6}"/>
+              </a:ext>
+            </a:extLst>
+          </p:cNvPr>
+          <p:cNvPicPr>
+            <a:picLocks noGrp="1" noChangeAspect="1"/>
+          </p:cNvPicPr>
+          <p:nvPr>
+            <p:ph sz="half" idx="2"/>
+          </p:nvPr>
+        </p:nvPicPr>
+        <p:blipFill>
+          <a:blip r:embed="rId4">
+            <a:extLst>
+              <a:ext uri="{96DAC541-7B7A-43D3-8B79-37D633B846F1}">
+                <asvg:svgBlip xmlns:asvg="http://schemas.microsoft.com/office/drawing/2016/SVG/main" r:embed="rId5"/>
+              </a:ext>
+            </a:extLst>
+          </a:blip>
+          <a:stretch>
+            <a:fillRect/>
+          </a:stretch>
+        </p:blipFill>
+        <p:spPr>
+          <a:xfrm>
+            <a:off x="705311" y="3545308"/>
+            <a:ext cx="5060992" cy="2642182"/>
+          </a:xfrm>
+          <a:prstGeom prst="rect">
+            <a:avLst/>
+          </a:prstGeom>
+        </p:spPr>
+      </p:pic>
+      <p:sp>
+        <p:nvSpPr>
+          <p:cNvPr id="19" name="Content Placeholder 18">
+            <a:extLst>
+              <a:ext uri="{FF2B5EF4-FFF2-40B4-BE49-F238E27FC236}">
+                <a16:creationId xmlns:a16="http://schemas.microsoft.com/office/drawing/2014/main" id="{886245DD-83CB-40AC-84DF-2B5A618F1435}"/>
+              </a:ext>
+            </a:extLst>
+          </p:cNvPr>
+          <p:cNvSpPr>
+            <a:spLocks noGrp="1"/>
+          </p:cNvSpPr>
+          <p:nvPr>
+            <p:ph sz="half" idx="1"/>
+          </p:nvPr>
+        </p:nvSpPr>
+        <p:spPr>
+          <a:xfrm>
+            <a:off x="6846137" y="2303563"/>
+            <a:ext cx="4602152" cy="3715424"/>
+          </a:xfrm>
+        </p:spPr>
+        <p:txBody>
+          <a:bodyPr vert="horz" lIns="91440" tIns="45720" rIns="91440" bIns="45720" rtlCol="0">
+            <a:normAutofit/>
+          </a:bodyPr>
+          <a:lstStyle/>
+          <a:p>
+            <a:pPr>
+              <a:lnSpc>
+                <a:spcPct val="100000"/>
+              </a:lnSpc>
+            </a:pPr>
+            <a:r>
+              <a:rPr lang="en-US" sz="1400" dirty="0"/>
+              <a:t>Previous success is one of the biggest predictors of future success</a:t>
+            </a:r>
+          </a:p>
+          <a:p>
+            <a:pPr>
+              <a:lnSpc>
+                <a:spcPct val="100000"/>
+              </a:lnSpc>
+            </a:pPr>
+            <a:r>
+              <a:rPr lang="en-US" sz="1400" dirty="0"/>
+              <a:t>Unfortunately, only about ~14% of the customers were previously contacted, and of those only ~3% made a deal</a:t>
+            </a:r>
+          </a:p>
+          <a:p>
+            <a:pPr>
+              <a:lnSpc>
+                <a:spcPct val="100000"/>
+              </a:lnSpc>
+            </a:pPr>
+            <a:r>
+              <a:rPr lang="en-US" sz="1400" dirty="0"/>
+              <a:t>Cell phones are more popular than landlines, but other than that it’s unclear why they have a relationship with conversion</a:t>
+            </a:r>
+          </a:p>
+          <a:p>
+            <a:pPr>
+              <a:lnSpc>
+                <a:spcPct val="100000"/>
+              </a:lnSpc>
+            </a:pPr>
+            <a:endParaRPr lang="en-US" sz="1400" dirty="0"/>
+          </a:p>
+          <a:p>
+            <a:pPr marL="0" indent="0">
+              <a:lnSpc>
+                <a:spcPct val="100000"/>
+              </a:lnSpc>
+              <a:buNone/>
+            </a:pPr>
+            <a:r>
+              <a:rPr lang="en-US" sz="1400" b="1" dirty="0"/>
+              <a:t>Recommendation:</a:t>
+            </a:r>
+          </a:p>
+          <a:p>
+            <a:pPr marL="0" indent="0">
+              <a:lnSpc>
+                <a:spcPct val="100000"/>
+              </a:lnSpc>
+              <a:buNone/>
+            </a:pPr>
+            <a:r>
+              <a:rPr lang="en-US" sz="1400" dirty="0"/>
+              <a:t>Spend your energy and resources returning to previous customers who were receptive to marketing.</a:t>
+            </a:r>
+          </a:p>
+          <a:p>
+            <a:pPr>
+              <a:lnSpc>
+                <a:spcPct val="100000"/>
+              </a:lnSpc>
+            </a:pPr>
+            <a:endParaRPr lang="en-US" sz="1400" dirty="0"/>
+          </a:p>
+        </p:txBody>
+      </p:sp>
+    </p:spTree>
+    <p:extLst>
+      <p:ext uri="{BB962C8B-B14F-4D97-AF65-F5344CB8AC3E}">
+        <p14:creationId xmlns:p14="http://schemas.microsoft.com/office/powerpoint/2010/main" val="1973002747"/>
+      </p:ext>
+    </p:extLst>
+  </p:cSld>
+  <p:clrMapOvr>
+    <a:masterClrMapping/>
+  </p:clrMapOvr>
+</p:sld>
+</file>
+
+<file path=ppt/slides/slide8.xml><?xml version="1.0" encoding="utf-8"?>
+<p:sld xmlns:a="http://schemas.openxmlformats.org/drawingml/2006/main" xmlns:r="http://schemas.openxmlformats.org/officeDocument/2006/relationships" xmlns:p="http://schemas.openxmlformats.org/presentationml/2006/main">
+  <p:cSld>
+    <p:bg>
+      <p:bgPr>
+        <a:solidFill>
+          <a:schemeClr val="bg1"/>
+        </a:solidFill>
+        <a:effectLst/>
+      </p:bgPr>
+    </p:bg>
+    <p:spTree>
+      <p:nvGrpSpPr>
+        <p:cNvPr id="1" name=""/>
+        <p:cNvGrpSpPr/>
+        <p:nvPr/>
+      </p:nvGrpSpPr>
+      <p:grpSpPr>
+        <a:xfrm>
+          <a:off x="0" y="0"/>
+          <a:ext cx="0" cy="0"/>
+          <a:chOff x="0" y="0"/>
+          <a:chExt cx="0" cy="0"/>
+        </a:xfrm>
+      </p:grpSpPr>
+      <p:sp useBgFill="1">
+        <p:nvSpPr>
+          <p:cNvPr id="30" name="Rectangle 29">
+            <a:extLst>
+              <a:ext uri="{FF2B5EF4-FFF2-40B4-BE49-F238E27FC236}">
+                <a16:creationId xmlns:a16="http://schemas.microsoft.com/office/drawing/2014/main" id="{1E94681D-2A4C-4A8D-B9B5-31D440D0328D}"/>
+              </a:ext>
+              <a:ext uri="{C183D7F6-B498-43B3-948B-1728B52AA6E4}">
+                <adec:decorative xmlns:adec="http://schemas.microsoft.com/office/drawing/2017/decorative" val="1"/>
+              </a:ext>
+            </a:extLst>
+          </p:cNvPr>
+          <p:cNvSpPr>
+            <a:spLocks noGrp="1" noRot="1" noChangeAspect="1" noMove="1" noResize="1" noEditPoints="1" noAdjustHandles="1" noChangeArrowheads="1" noChangeShapeType="1" noTextEdit="1"/>
+          </p:cNvSpPr>
+          <p:nvPr>
+            <p:extLst>
+              <p:ext uri="{386F3935-93C4-4BCD-93E2-E3B085C9AB24}">
+                <p16:designElem xmlns:p16="http://schemas.microsoft.com/office/powerpoint/2015/main" val="1"/>
+              </p:ext>
+            </p:extLst>
+          </p:nvPr>
+        </p:nvSpPr>
+        <p:spPr>
+          <a:xfrm>
+            <a:off x="0" y="0"/>
+            <a:ext cx="12192000" cy="6858000"/>
+          </a:xfrm>
+          <a:prstGeom prst="rect">
+            <a:avLst/>
+          </a:prstGeom>
+          <a:ln>
+            <a:noFill/>
+          </a:ln>
+        </p:spPr>
+        <p:style>
+          <a:lnRef idx="2">
+            <a:schemeClr val="accent1">
+              <a:shade val="50000"/>
+            </a:schemeClr>
+          </a:lnRef>
+          <a:fillRef idx="1">
+            <a:schemeClr val="accent1"/>
+          </a:fillRef>
+          <a:effectRef idx="0">
+            <a:schemeClr val="accent1"/>
+          </a:effectRef>
+          <a:fontRef idx="minor">
+            <a:schemeClr val="lt1"/>
+          </a:fontRef>
+        </p:style>
+        <p:txBody>
+          <a:bodyPr rtlCol="0" anchor="ctr"/>
+          <a:lstStyle/>
+          <a:p>
+            <a:pPr algn="ctr"/>
+            <a:endParaRPr lang="en-US"/>
+          </a:p>
+        </p:txBody>
+      </p:sp>
+      <p:sp>
+        <p:nvSpPr>
+          <p:cNvPr id="32" name="Rectangle 31">
+            <a:extLst>
+              <a:ext uri="{FF2B5EF4-FFF2-40B4-BE49-F238E27FC236}">
+                <a16:creationId xmlns:a16="http://schemas.microsoft.com/office/drawing/2014/main" id="{04B7AC44-1B7B-4F09-9AA4-3DFDEC5751A8}"/>
+              </a:ext>
+              <a:ext uri="{C183D7F6-B498-43B3-948B-1728B52AA6E4}">
+                <adec:decorative xmlns:adec="http://schemas.microsoft.com/office/drawing/2017/decorative" val="1"/>
+              </a:ext>
+            </a:extLst>
+          </p:cNvPr>
+          <p:cNvSpPr>
+            <a:spLocks noGrp="1" noRot="1" noChangeAspect="1" noMove="1" noResize="1" noEditPoints="1" noAdjustHandles="1" noChangeArrowheads="1" noChangeShapeType="1" noTextEdit="1"/>
+          </p:cNvSpPr>
+          <p:nvPr>
+            <p:extLst>
+              <p:ext uri="{386F3935-93C4-4BCD-93E2-E3B085C9AB24}">
+                <p16:designElem xmlns:p16="http://schemas.microsoft.com/office/powerpoint/2015/main" val="1"/>
+              </p:ext>
+            </p:extLst>
+          </p:nvPr>
+        </p:nvSpPr>
+        <p:spPr>
+          <a:xfrm>
+            <a:off x="234696" y="237744"/>
+            <a:ext cx="11722608" cy="6382512"/>
+          </a:xfrm>
+          <a:prstGeom prst="rect">
+            <a:avLst/>
+          </a:prstGeom>
+          <a:solidFill>
+            <a:schemeClr val="bg1">
+              <a:lumMod val="75000"/>
+              <a:alpha val="60000"/>
+            </a:schemeClr>
+          </a:solidFill>
+          <a:ln w="6350" cap="flat" cmpd="sng" algn="ctr">
+            <a:noFill/>
+            <a:prstDash val="solid"/>
+          </a:ln>
+          <a:effectLst>
+            <a:softEdge rad="0"/>
+          </a:effectLst>
+        </p:spPr>
+      </p:sp>
+      <p:sp>
+        <p:nvSpPr>
+          <p:cNvPr id="34" name="Rectangle 33">
+            <a:extLst>
+              <a:ext uri="{FF2B5EF4-FFF2-40B4-BE49-F238E27FC236}">
+                <a16:creationId xmlns:a16="http://schemas.microsoft.com/office/drawing/2014/main" id="{6683E473-94FF-4ACE-9433-1F14799E8907}"/>
+              </a:ext>
+              <a:ext uri="{C183D7F6-B498-43B3-948B-1728B52AA6E4}">
+                <adec:decorative xmlns:adec="http://schemas.microsoft.com/office/drawing/2017/decorative" val="1"/>
+              </a:ext>
+            </a:extLst>
+          </p:cNvPr>
+          <p:cNvSpPr>
+            <a:spLocks noGrp="1" noRot="1" noChangeAspect="1" noMove="1" noResize="1" noEditPoints="1" noAdjustHandles="1" noChangeArrowheads="1" noChangeShapeType="1" noTextEdit="1"/>
+          </p:cNvSpPr>
+          <p:nvPr>
+            <p:extLst>
+              <p:ext uri="{386F3935-93C4-4BCD-93E2-E3B085C9AB24}">
+                <p16:designElem xmlns:p16="http://schemas.microsoft.com/office/powerpoint/2015/main" val="1"/>
+              </p:ext>
+            </p:extLst>
+          </p:nvPr>
+        </p:nvSpPr>
+        <p:spPr>
+          <a:xfrm>
+            <a:off x="371856" y="374904"/>
+            <a:ext cx="11448288" cy="6108192"/>
+          </a:xfrm>
+          <a:prstGeom prst="rect">
+            <a:avLst/>
+          </a:prstGeom>
+          <a:noFill/>
+          <a:ln w="6350" cap="sq" cmpd="sng" algn="ctr">
+            <a:solidFill>
+              <a:schemeClr val="tx1">
+                <a:lumMod val="85000"/>
+                <a:lumOff val="15000"/>
+              </a:schemeClr>
+            </a:solidFill>
+            <a:prstDash val="solid"/>
+            <a:miter lim="800000"/>
+          </a:ln>
+          <a:effectLst/>
+        </p:spPr>
+      </p:sp>
+      <p:sp>
+        <p:nvSpPr>
+          <p:cNvPr id="36" name="Rectangle 35">
+            <a:extLst>
+              <a:ext uri="{FF2B5EF4-FFF2-40B4-BE49-F238E27FC236}">
+                <a16:creationId xmlns:a16="http://schemas.microsoft.com/office/drawing/2014/main" id="{282E2A95-1A08-4118-83C6-B1CA5648E075}"/>
+              </a:ext>
+              <a:ext uri="{C183D7F6-B498-43B3-948B-1728B52AA6E4}">
+                <adec:decorative xmlns:adec="http://schemas.microsoft.com/office/drawing/2017/decorative" val="1"/>
+              </a:ext>
+            </a:extLst>
+          </p:cNvPr>
+          <p:cNvSpPr>
+            <a:spLocks noGrp="1" noRot="1" noChangeAspect="1" noMove="1" noResize="1" noEditPoints="1" noAdjustHandles="1" noChangeArrowheads="1" noChangeShapeType="1" noTextEdit="1"/>
+          </p:cNvSpPr>
+          <p:nvPr>
+            <p:extLst>
+              <p:ext uri="{386F3935-93C4-4BCD-93E2-E3B085C9AB24}">
+                <p16:designElem xmlns:p16="http://schemas.microsoft.com/office/powerpoint/2015/main" val="1"/>
+              </p:ext>
+            </p:extLst>
+          </p:nvPr>
+        </p:nvSpPr>
+        <p:spPr>
+          <a:xfrm>
+            <a:off x="0" y="0"/>
+            <a:ext cx="12192000" cy="6858000"/>
+          </a:xfrm>
+          <a:prstGeom prst="rect">
+            <a:avLst/>
+          </a:prstGeom>
+          <a:ln>
+            <a:noFill/>
+          </a:ln>
+        </p:spPr>
+        <p:style>
+          <a:lnRef idx="2">
+            <a:schemeClr val="accent1">
+              <a:shade val="50000"/>
+            </a:schemeClr>
+          </a:lnRef>
+          <a:fillRef idx="1001">
+            <a:schemeClr val="lt1"/>
+          </a:fillRef>
+          <a:effectRef idx="0">
+            <a:schemeClr val="accent1"/>
+          </a:effectRef>
+          <a:fontRef idx="minor">
+            <a:schemeClr val="lt1"/>
+          </a:fontRef>
+        </p:style>
+        <p:txBody>
+          <a:bodyPr rtlCol="0" anchor="ctr"/>
+          <a:lstStyle/>
+          <a:p>
+            <a:pPr algn="ctr"/>
+            <a:endParaRPr lang="en-US"/>
+          </a:p>
+        </p:txBody>
+      </p:sp>
+      <p:sp>
+        <p:nvSpPr>
+          <p:cNvPr id="38" name="Rectangle 37">
+            <a:extLst>
+              <a:ext uri="{FF2B5EF4-FFF2-40B4-BE49-F238E27FC236}">
+                <a16:creationId xmlns:a16="http://schemas.microsoft.com/office/drawing/2014/main" id="{68DC0EC7-60EA-4BD3-BC04-D547DE1B2891}"/>
+              </a:ext>
+              <a:ext uri="{C183D7F6-B498-43B3-948B-1728B52AA6E4}">
+                <adec:decorative xmlns:adec="http://schemas.microsoft.com/office/drawing/2017/decorative" val="1"/>
+              </a:ext>
+            </a:extLst>
+          </p:cNvPr>
+          <p:cNvSpPr>
+            <a:spLocks noGrp="1" noRot="1" noChangeAspect="1" noMove="1" noResize="1" noEditPoints="1" noAdjustHandles="1" noChangeArrowheads="1" noChangeShapeType="1" noTextEdit="1"/>
+          </p:cNvSpPr>
+          <p:nvPr>
+            <p:extLst>
+              <p:ext uri="{386F3935-93C4-4BCD-93E2-E3B085C9AB24}">
+                <p16:designElem xmlns:p16="http://schemas.microsoft.com/office/powerpoint/2015/main" val="1"/>
+              </p:ext>
+            </p:extLst>
+          </p:nvPr>
+        </p:nvSpPr>
+        <p:spPr>
+          <a:xfrm>
+            <a:off x="410122" y="413053"/>
+            <a:ext cx="8212114" cy="6064596"/>
+          </a:xfrm>
+          <a:prstGeom prst="rect">
+            <a:avLst/>
+          </a:prstGeom>
+          <a:noFill/>
+          <a:ln w="6350" cap="sq" cmpd="sng" algn="ctr">
+            <a:solidFill>
+              <a:srgbClr val="404040"/>
+            </a:solidFill>
+            <a:prstDash val="solid"/>
+            <a:miter lim="800000"/>
+          </a:ln>
+          <a:effectLst/>
+        </p:spPr>
+      </p:sp>
+      <p:pic>
+        <p:nvPicPr>
+          <p:cNvPr id="6" name="Content Placeholder 5">
+            <a:extLst>
+              <a:ext uri="{FF2B5EF4-FFF2-40B4-BE49-F238E27FC236}">
+                <a16:creationId xmlns:a16="http://schemas.microsoft.com/office/drawing/2014/main" id="{202C1E37-AB2E-41C8-8C3F-0C9A80079C44}"/>
+              </a:ext>
+            </a:extLst>
+          </p:cNvPr>
+          <p:cNvPicPr>
+            <a:picLocks noGrp="1" noChangeAspect="1"/>
+          </p:cNvPicPr>
+          <p:nvPr>
+            <p:ph sz="half" idx="1"/>
+          </p:nvPr>
+        </p:nvPicPr>
+        <p:blipFill>
+          <a:blip r:embed="rId2">
+            <a:extLst>
+              <a:ext uri="{96DAC541-7B7A-43D3-8B79-37D633B846F1}">
+                <asvg:svgBlip xmlns:asvg="http://schemas.microsoft.com/office/drawing/2016/SVG/main" r:embed="rId3"/>
+              </a:ext>
+            </a:extLst>
+          </a:blip>
+          <a:stretch>
+            <a:fillRect/>
+          </a:stretch>
+        </p:blipFill>
+        <p:spPr>
+          <a:xfrm>
+            <a:off x="1088838" y="882398"/>
+            <a:ext cx="6869602" cy="5121612"/>
+          </a:xfrm>
+          <a:prstGeom prst="rect">
+            <a:avLst/>
+          </a:prstGeom>
+        </p:spPr>
+      </p:pic>
+      <p:sp>
+        <p:nvSpPr>
+          <p:cNvPr id="40" name="Rectangle 39">
+            <a:extLst>
+              <a:ext uri="{FF2B5EF4-FFF2-40B4-BE49-F238E27FC236}">
+                <a16:creationId xmlns:a16="http://schemas.microsoft.com/office/drawing/2014/main" id="{2FFEFC7E-85EE-4AC9-A351-FBEB13A1D622}"/>
+              </a:ext>
+              <a:ext uri="{C183D7F6-B498-43B3-948B-1728B52AA6E4}">
+                <adec:decorative xmlns:adec="http://schemas.microsoft.com/office/drawing/2017/decorative" val="1"/>
+              </a:ext>
+            </a:extLst>
+          </p:cNvPr>
+          <p:cNvSpPr>
+            <a:spLocks noGrp="1" noRot="1" noChangeAspect="1" noMove="1" noResize="1" noEditPoints="1" noAdjustHandles="1" noChangeArrowheads="1" noChangeShapeType="1" noTextEdit="1"/>
+          </p:cNvSpPr>
+          <p:nvPr>
+            <p:extLst>
+              <p:ext uri="{386F3935-93C4-4BCD-93E2-E3B085C9AB24}">
+                <p16:designElem xmlns:p16="http://schemas.microsoft.com/office/powerpoint/2015/main" val="1"/>
+              </p:ext>
+            </p:extLst>
+          </p:nvPr>
+        </p:nvSpPr>
+        <p:spPr>
+          <a:xfrm>
+            <a:off x="9020386" y="237744"/>
+            <a:ext cx="2926080" cy="6382512"/>
+          </a:xfrm>
+          <a:prstGeom prst="rect">
+            <a:avLst/>
+          </a:prstGeom>
+          <a:solidFill>
+            <a:schemeClr val="bg1">
+              <a:lumMod val="85000"/>
+              <a:alpha val="60000"/>
+            </a:schemeClr>
+          </a:solidFill>
+          <a:ln>
+            <a:noFill/>
+          </a:ln>
+        </p:spPr>
+        <p:style>
+          <a:lnRef idx="2">
+            <a:schemeClr val="accent1">
+              <a:shade val="50000"/>
+            </a:schemeClr>
+          </a:lnRef>
+          <a:fillRef idx="1">
+            <a:schemeClr val="accent1"/>
+          </a:fillRef>
+          <a:effectRef idx="0">
+            <a:schemeClr val="accent1"/>
+          </a:effectRef>
+          <a:fontRef idx="minor">
+            <a:schemeClr val="lt1"/>
+          </a:fontRef>
+        </p:style>
+      </p:sp>
+      <p:sp>
+        <p:nvSpPr>
+          <p:cNvPr id="42" name="Rectangle 41">
+            <a:extLst>
+              <a:ext uri="{FF2B5EF4-FFF2-40B4-BE49-F238E27FC236}">
+                <a16:creationId xmlns:a16="http://schemas.microsoft.com/office/drawing/2014/main" id="{CB2511BB-FC4C-45F3-94EB-661D6806C942}"/>
+              </a:ext>
+              <a:ext uri="{C183D7F6-B498-43B3-948B-1728B52AA6E4}">
+                <adec:decorative xmlns:adec="http://schemas.microsoft.com/office/drawing/2017/decorative" val="1"/>
+              </a:ext>
+            </a:extLst>
+          </p:cNvPr>
+          <p:cNvSpPr>
+            <a:spLocks noGrp="1" noRot="1" noChangeAspect="1" noMove="1" noResize="1" noEditPoints="1" noAdjustHandles="1" noChangeArrowheads="1" noChangeShapeType="1" noTextEdit="1"/>
+          </p:cNvSpPr>
+          <p:nvPr>
+            <p:extLst>
+              <p:ext uri="{386F3935-93C4-4BCD-93E2-E3B085C9AB24}">
+                <p16:designElem xmlns:p16="http://schemas.microsoft.com/office/powerpoint/2015/main" val="1"/>
+              </p:ext>
+            </p:extLst>
+          </p:nvPr>
+        </p:nvSpPr>
+        <p:spPr>
+          <a:xfrm>
+            <a:off x="9156699" y="413053"/>
+            <a:ext cx="2616201" cy="6064596"/>
+          </a:xfrm>
+          <a:prstGeom prst="rect">
+            <a:avLst/>
+          </a:prstGeom>
+          <a:noFill/>
+          <a:ln w="6350">
+            <a:solidFill>
+              <a:schemeClr val="tx1">
+                <a:lumMod val="75000"/>
+                <a:lumOff val="25000"/>
+              </a:schemeClr>
+            </a:solidFill>
+          </a:ln>
+        </p:spPr>
+        <p:style>
+          <a:lnRef idx="2">
+            <a:schemeClr val="accent1">
+              <a:shade val="50000"/>
+            </a:schemeClr>
+          </a:lnRef>
+          <a:fillRef idx="1">
+            <a:schemeClr val="accent1"/>
+          </a:fillRef>
+          <a:effectRef idx="0">
+            <a:schemeClr val="accent1"/>
+          </a:effectRef>
+          <a:fontRef idx="minor">
+            <a:schemeClr val="lt1"/>
+          </a:fontRef>
+        </p:style>
+        <p:txBody>
+          <a:bodyPr rtlCol="0" anchor="ctr"/>
+          <a:lstStyle/>
+          <a:p>
+            <a:pPr algn="ctr"/>
+            <a:endParaRPr lang="en-US"/>
+          </a:p>
+        </p:txBody>
+      </p:sp>
+      <p:sp>
+        <p:nvSpPr>
+          <p:cNvPr id="2" name="Title 1">
+            <a:extLst>
+              <a:ext uri="{FF2B5EF4-FFF2-40B4-BE49-F238E27FC236}">
+                <a16:creationId xmlns:a16="http://schemas.microsoft.com/office/drawing/2014/main" id="{2D9F5712-9A8D-4198-8606-C182CC447B33}"/>
+              </a:ext>
+            </a:extLst>
+          </p:cNvPr>
+          <p:cNvSpPr>
+            <a:spLocks noGrp="1"/>
+          </p:cNvSpPr>
+          <p:nvPr>
+            <p:ph type="title"/>
+          </p:nvPr>
+        </p:nvSpPr>
+        <p:spPr>
+          <a:xfrm>
+            <a:off x="9321801" y="612844"/>
+            <a:ext cx="2312480" cy="925426"/>
+          </a:xfrm>
+        </p:spPr>
+        <p:txBody>
+          <a:bodyPr vert="horz" lIns="91440" tIns="45720" rIns="91440" bIns="45720" rtlCol="0" anchor="b">
+            <a:normAutofit/>
+          </a:bodyPr>
+          <a:lstStyle/>
+          <a:p>
+            <a:r>
+              <a:rPr lang="en-US" sz="2800" dirty="0"/>
+              <a:t>Relax in the Summer</a:t>
+            </a:r>
+          </a:p>
+        </p:txBody>
+      </p:sp>
+      <p:sp>
+        <p:nvSpPr>
+          <p:cNvPr id="4" name="Content Placeholder 3">
+            <a:extLst>
+              <a:ext uri="{FF2B5EF4-FFF2-40B4-BE49-F238E27FC236}">
+                <a16:creationId xmlns:a16="http://schemas.microsoft.com/office/drawing/2014/main" id="{F4FD437B-ED4F-4DE1-A9C2-5A599F55BDF4}"/>
+              </a:ext>
+            </a:extLst>
+          </p:cNvPr>
+          <p:cNvSpPr>
+            <a:spLocks noGrp="1"/>
+          </p:cNvSpPr>
+          <p:nvPr>
+            <p:ph sz="half" idx="2"/>
+          </p:nvPr>
+        </p:nvSpPr>
+        <p:spPr>
+          <a:xfrm>
+            <a:off x="9321801" y="1675430"/>
+            <a:ext cx="2312479" cy="4328581"/>
+          </a:xfrm>
+        </p:spPr>
+        <p:txBody>
+          <a:bodyPr vert="horz" lIns="91440" tIns="45720" rIns="91440" bIns="45720" rtlCol="0">
+            <a:normAutofit/>
+          </a:bodyPr>
+          <a:lstStyle/>
+          <a:p>
+            <a:pPr>
+              <a:lnSpc>
+                <a:spcPct val="100000"/>
+              </a:lnSpc>
+            </a:pPr>
+            <a:r>
+              <a:rPr lang="en-US" sz="1300" dirty="0">
+                <a:solidFill>
+                  <a:schemeClr val="tx1">
+                    <a:lumMod val="85000"/>
+                    <a:lumOff val="15000"/>
+                  </a:schemeClr>
+                </a:solidFill>
+              </a:rPr>
+              <a:t>May has the highest</a:t>
+            </a:r>
+            <a:r>
+              <a:rPr lang="en-US" sz="1300" b="1" dirty="0">
+                <a:solidFill>
+                  <a:schemeClr val="tx1">
+                    <a:lumMod val="85000"/>
+                    <a:lumOff val="15000"/>
+                  </a:schemeClr>
+                </a:solidFill>
+              </a:rPr>
+              <a:t> </a:t>
+            </a:r>
+            <a:r>
+              <a:rPr lang="en-US" sz="1300" dirty="0">
+                <a:solidFill>
+                  <a:schemeClr val="tx1">
+                    <a:lumMod val="85000"/>
+                    <a:lumOff val="15000"/>
+                  </a:schemeClr>
+                </a:solidFill>
+              </a:rPr>
+              <a:t>total</a:t>
+            </a:r>
+            <a:r>
+              <a:rPr lang="en-US" sz="1300" b="1" dirty="0">
+                <a:solidFill>
+                  <a:schemeClr val="tx1">
+                    <a:lumMod val="85000"/>
+                    <a:lumOff val="15000"/>
+                  </a:schemeClr>
+                </a:solidFill>
+              </a:rPr>
+              <a:t> </a:t>
+            </a:r>
+            <a:r>
+              <a:rPr lang="en-US" sz="1300" dirty="0">
+                <a:solidFill>
+                  <a:schemeClr val="tx1">
+                    <a:lumMod val="85000"/>
+                    <a:lumOff val="15000"/>
+                  </a:schemeClr>
+                </a:solidFill>
+              </a:rPr>
+              <a:t>sales</a:t>
+            </a:r>
+            <a:r>
+              <a:rPr lang="en-US" sz="1300" b="1" dirty="0">
+                <a:solidFill>
+                  <a:schemeClr val="tx1">
+                    <a:lumMod val="85000"/>
+                    <a:lumOff val="15000"/>
+                  </a:schemeClr>
+                </a:solidFill>
+              </a:rPr>
+              <a:t> </a:t>
+            </a:r>
+            <a:r>
+              <a:rPr lang="en-US" sz="1300" dirty="0">
+                <a:solidFill>
+                  <a:schemeClr val="tx1">
+                    <a:lumMod val="85000"/>
+                    <a:lumOff val="15000"/>
+                  </a:schemeClr>
+                </a:solidFill>
+              </a:rPr>
+              <a:t>by the lowest</a:t>
+            </a:r>
+            <a:r>
+              <a:rPr lang="en-US" sz="1300" b="1" dirty="0">
+                <a:solidFill>
+                  <a:schemeClr val="tx1">
+                    <a:lumMod val="85000"/>
+                    <a:lumOff val="15000"/>
+                  </a:schemeClr>
+                </a:solidFill>
+              </a:rPr>
+              <a:t> </a:t>
+            </a:r>
+            <a:r>
+              <a:rPr lang="en-US" sz="1300" dirty="0">
+                <a:solidFill>
+                  <a:schemeClr val="tx1">
+                    <a:lumMod val="85000"/>
+                    <a:lumOff val="15000"/>
+                  </a:schemeClr>
+                </a:solidFill>
+              </a:rPr>
+              <a:t>average conversion rate</a:t>
+            </a:r>
+          </a:p>
+          <a:p>
+            <a:pPr>
+              <a:lnSpc>
+                <a:spcPct val="100000"/>
+              </a:lnSpc>
+            </a:pPr>
+            <a:r>
+              <a:rPr lang="en-US" sz="1300" dirty="0">
+                <a:solidFill>
+                  <a:schemeClr val="tx1">
+                    <a:lumMod val="85000"/>
+                    <a:lumOff val="15000"/>
+                  </a:schemeClr>
+                </a:solidFill>
+              </a:rPr>
+              <a:t>It also has by far the most data points of any month, at nearly 14,000</a:t>
+            </a:r>
+          </a:p>
+          <a:p>
+            <a:pPr>
+              <a:lnSpc>
+                <a:spcPct val="100000"/>
+              </a:lnSpc>
+            </a:pPr>
+            <a:r>
+              <a:rPr lang="en-US" sz="1300" dirty="0">
+                <a:solidFill>
+                  <a:schemeClr val="tx1">
+                    <a:lumMod val="85000"/>
+                    <a:lumOff val="15000"/>
+                  </a:schemeClr>
+                </a:solidFill>
+              </a:rPr>
+              <a:t>The summer months in general have the highest representation in the dataset</a:t>
+            </a:r>
+          </a:p>
+          <a:p>
+            <a:pPr marL="0">
+              <a:lnSpc>
+                <a:spcPct val="100000"/>
+              </a:lnSpc>
+            </a:pPr>
+            <a:endParaRPr lang="en-US" sz="1300" b="1" dirty="0">
+              <a:solidFill>
+                <a:schemeClr val="tx1">
+                  <a:lumMod val="85000"/>
+                  <a:lumOff val="15000"/>
+                </a:schemeClr>
+              </a:solidFill>
+            </a:endParaRPr>
+          </a:p>
+          <a:p>
+            <a:pPr marL="0" indent="0">
+              <a:lnSpc>
+                <a:spcPct val="100000"/>
+              </a:lnSpc>
+              <a:buNone/>
+            </a:pPr>
+            <a:r>
+              <a:rPr lang="en-US" sz="1300" b="1" dirty="0">
+                <a:solidFill>
+                  <a:schemeClr val="tx1">
+                    <a:lumMod val="85000"/>
+                    <a:lumOff val="15000"/>
+                  </a:schemeClr>
+                </a:solidFill>
+              </a:rPr>
+              <a:t>Recommendation</a:t>
+            </a:r>
+            <a:r>
+              <a:rPr lang="en-US" sz="1300" dirty="0">
+                <a:solidFill>
+                  <a:schemeClr val="tx1">
+                    <a:lumMod val="85000"/>
+                    <a:lumOff val="15000"/>
+                  </a:schemeClr>
+                </a:solidFill>
+              </a:rPr>
+              <a:t>: don’t put as much energy into Summer marketing as you’re used to.</a:t>
+            </a:r>
+          </a:p>
+        </p:txBody>
+      </p:sp>
+    </p:spTree>
+    <p:extLst>
+      <p:ext uri="{BB962C8B-B14F-4D97-AF65-F5344CB8AC3E}">
+        <p14:creationId xmlns:p14="http://schemas.microsoft.com/office/powerpoint/2010/main" val="3145453168"/>
+      </p:ext>
+    </p:extLst>
+  </p:cSld>
+  <p:clrMapOvr>
+    <a:masterClrMapping/>
+  </p:clrMapOvr>
+</p:sld>
+</file>
+
+<file path=ppt/slides/slide9.xml><?xml version="1.0" encoding="utf-8"?>
 <p:sld xmlns:a="http://schemas.openxmlformats.org/drawingml/2006/main" xmlns:r="http://schemas.openxmlformats.org/officeDocument/2006/relationships" xmlns:p="http://schemas.openxmlformats.org/presentationml/2006/main">
   <p:cSld>
     <p:spTree>
@@ -8787,7 +10303,7 @@
           <p:cNvPr id="2" name="Title 1">
             <a:extLst>
               <a:ext uri="{FF2B5EF4-FFF2-40B4-BE49-F238E27FC236}">
-                <a16:creationId xmlns:a16="http://schemas.microsoft.com/office/drawing/2014/main" id="{D1377214-098C-43FD-85FB-541E1A269C81}"/>
+                <a16:creationId xmlns:a16="http://schemas.microsoft.com/office/drawing/2014/main" id="{7CFD2AA1-2481-4624-8FB9-4C36EA1C2FB9}"/>
               </a:ext>
             </a:extLst>
           </p:cNvPr>
@@ -8803,7 +10319,10 @@
           <a:bodyPr/>
           <a:lstStyle/>
           <a:p>
-            <a:endParaRPr lang="en-US"/>
+            <a:r>
+              <a:rPr lang="en-US" dirty="0"/>
+              <a:t>Future Work: More Models</a:t>
+            </a:r>
           </a:p>
         </p:txBody>
       </p:sp>
@@ -8812,7 +10331,7 @@
           <p:cNvPr id="3" name="Content Placeholder 2">
             <a:extLst>
               <a:ext uri="{FF2B5EF4-FFF2-40B4-BE49-F238E27FC236}">
-                <a16:creationId xmlns:a16="http://schemas.microsoft.com/office/drawing/2014/main" id="{0A9A3C69-8122-41E1-8F7C-138ED92B1D84}"/>
+                <a16:creationId xmlns:a16="http://schemas.microsoft.com/office/drawing/2014/main" id="{48BC3E87-3000-4BFD-882A-64820F65DFC8}"/>
               </a:ext>
             </a:extLst>
           </p:cNvPr>
@@ -8825,19 +10344,124 @@
         </p:nvSpPr>
         <p:spPr/>
         <p:txBody>
-          <a:bodyPr/>
+          <a:bodyPr>
+            <a:normAutofit fontScale="85000" lnSpcReduction="10000"/>
+          </a:bodyPr>
           <a:lstStyle/>
           <a:p>
-            <a:endParaRPr lang="en-US"/>
+            <a:pPr marL="0" indent="0">
+              <a:lnSpc>
+                <a:spcPct val="150000"/>
+              </a:lnSpc>
+              <a:buNone/>
+            </a:pPr>
+            <a:r>
+              <a:rPr lang="en-US" dirty="0"/>
+              <a:t>Build and optimize models of different types:</a:t>
+            </a:r>
+          </a:p>
+          <a:p>
+            <a:pPr marL="617220" lvl="1" indent="-342900">
+              <a:lnSpc>
+                <a:spcPct val="150000"/>
+              </a:lnSpc>
+              <a:buFont typeface="+mj-lt"/>
+              <a:buAutoNum type="arabicPeriod"/>
+            </a:pPr>
+            <a:r>
+              <a:rPr lang="en-US" dirty="0"/>
+              <a:t>Random Forest Classifier</a:t>
+            </a:r>
+          </a:p>
+          <a:p>
+            <a:pPr lvl="2">
+              <a:lnSpc>
+                <a:spcPct val="150000"/>
+              </a:lnSpc>
+            </a:pPr>
+            <a:r>
+              <a:rPr lang="en-US" dirty="0"/>
+              <a:t>No multi-collinearity issue</a:t>
+            </a:r>
+          </a:p>
+          <a:p>
+            <a:pPr lvl="2">
+              <a:lnSpc>
+                <a:spcPct val="150000"/>
+              </a:lnSpc>
+            </a:pPr>
+            <a:r>
+              <a:rPr lang="en-US" dirty="0"/>
+              <a:t>Many hyperparameters to tune</a:t>
+            </a:r>
+          </a:p>
+          <a:p>
+            <a:pPr marL="617220" lvl="1" indent="-342900">
+              <a:lnSpc>
+                <a:spcPct val="150000"/>
+              </a:lnSpc>
+              <a:buFont typeface="+mj-lt"/>
+              <a:buAutoNum type="arabicPeriod"/>
+            </a:pPr>
+            <a:r>
+              <a:rPr lang="en-US" dirty="0"/>
+              <a:t>Linear Support Vector Classification</a:t>
+            </a:r>
+          </a:p>
+          <a:p>
+            <a:pPr lvl="2">
+              <a:lnSpc>
+                <a:spcPct val="150000"/>
+              </a:lnSpc>
+            </a:pPr>
+            <a:r>
+              <a:rPr lang="en-US" dirty="0"/>
+              <a:t>Can accommodate datasets of this size, unlike other SVMs</a:t>
+            </a:r>
+          </a:p>
+          <a:p>
+            <a:pPr marL="617220" lvl="1" indent="-342900">
+              <a:lnSpc>
+                <a:spcPct val="150000"/>
+              </a:lnSpc>
+              <a:buFont typeface="+mj-lt"/>
+              <a:buAutoNum type="arabicPeriod"/>
+            </a:pPr>
+            <a:r>
+              <a:rPr lang="en-US" dirty="0"/>
+              <a:t>K Neighbors Classification</a:t>
+            </a:r>
+          </a:p>
+          <a:p>
+            <a:pPr lvl="2">
+              <a:lnSpc>
+                <a:spcPct val="150000"/>
+              </a:lnSpc>
+            </a:pPr>
+            <a:r>
+              <a:rPr lang="en-US" dirty="0"/>
+              <a:t>No multi-collinearity issue</a:t>
+            </a:r>
+          </a:p>
+          <a:p>
+            <a:pPr lvl="2">
+              <a:lnSpc>
+                <a:spcPct val="150000"/>
+              </a:lnSpc>
+            </a:pPr>
+            <a:r>
+              <a:rPr lang="en-US" dirty="0"/>
+              <a:t>Few hyperparameters to tune, but less sophistication</a:t>
+            </a:r>
           </a:p>
         </p:txBody>
       </p:sp>
       <p:sp>
         <p:nvSpPr>
-          <p:cNvPr id="4" name="Content Placeholder 3">
+          <p:cNvPr id="5" name="Content Placeholder 4">
             <a:extLst>
               <a:ext uri="{FF2B5EF4-FFF2-40B4-BE49-F238E27FC236}">
-                <a16:creationId xmlns:a16="http://schemas.microsoft.com/office/drawing/2014/main" id="{E8726121-F976-4621-993C-81EC8FA838D4}"/>
+                <a16:creationId xmlns:a16="http://schemas.microsoft.com/office/drawing/2014/main" id="{173B7578-E87B-4F84-A5B9-C2B9DB171C06}"/>
               </a:ext>
             </a:extLst>
           </p:cNvPr>
@@ -8848,19 +10472,101 @@
             <p:ph sz="half" idx="2"/>
           </p:nvPr>
         </p:nvSpPr>
-        <p:spPr/>
+        <p:spPr>
+          <a:xfrm>
+            <a:off x="6461760" y="3247296"/>
+            <a:ext cx="4663440" cy="2604863"/>
+          </a:xfrm>
+        </p:spPr>
         <p:txBody>
-          <a:bodyPr/>
+          <a:bodyPr>
+            <a:normAutofit fontScale="85000" lnSpcReduction="10000"/>
+          </a:bodyPr>
           <a:lstStyle/>
           <a:p>
-            <a:endParaRPr lang="en-US"/>
+            <a:pPr marL="0" indent="0">
+              <a:lnSpc>
+                <a:spcPct val="150000"/>
+              </a:lnSpc>
+              <a:buNone/>
+            </a:pPr>
+            <a:r>
+              <a:rPr lang="en-US" dirty="0"/>
+              <a:t>Experiment with feature engineering and joining with other datasets.</a:t>
+            </a:r>
+          </a:p>
+          <a:p>
+            <a:pPr lvl="1">
+              <a:lnSpc>
+                <a:spcPct val="150000"/>
+              </a:lnSpc>
+            </a:pPr>
+            <a:r>
+              <a:rPr lang="en-US" dirty="0"/>
+              <a:t>Perhaps other strong positive features like ‘</a:t>
+            </a:r>
+            <a:r>
+              <a:rPr lang="en-US" dirty="0" err="1"/>
+              <a:t>prev_success</a:t>
+            </a:r>
+            <a:r>
+              <a:rPr lang="en-US" dirty="0"/>
+              <a:t>’ can be engineered</a:t>
+            </a:r>
+          </a:p>
+          <a:p>
+            <a:pPr lvl="1">
+              <a:lnSpc>
+                <a:spcPct val="150000"/>
+              </a:lnSpc>
+            </a:pPr>
+            <a:r>
+              <a:rPr lang="en-US" dirty="0"/>
+              <a:t>Consider whether new features will be highly correlated with other features, unless using non-linear model</a:t>
+            </a:r>
           </a:p>
         </p:txBody>
       </p:sp>
+      <p:pic>
+        <p:nvPicPr>
+          <p:cNvPr id="7" name="Graphic 6" descr="Abacus with solid fill">
+            <a:extLst>
+              <a:ext uri="{FF2B5EF4-FFF2-40B4-BE49-F238E27FC236}">
+                <a16:creationId xmlns:a16="http://schemas.microsoft.com/office/drawing/2014/main" id="{07E55579-313E-4C10-BDD3-581C23BE2957}"/>
+              </a:ext>
+            </a:extLst>
+          </p:cNvPr>
+          <p:cNvPicPr>
+            <a:picLocks noChangeAspect="1"/>
+          </p:cNvPicPr>
+          <p:nvPr/>
+        </p:nvPicPr>
+        <p:blipFill>
+          <a:blip r:embed="rId2">
+            <a:extLst>
+              <a:ext uri="{96DAC541-7B7A-43D3-8B79-37D633B846F1}">
+                <asvg:svgBlip xmlns:asvg="http://schemas.microsoft.com/office/drawing/2016/SVG/main" r:embed="rId3"/>
+              </a:ext>
+            </a:extLst>
+          </a:blip>
+          <a:stretch>
+            <a:fillRect/>
+          </a:stretch>
+        </p:blipFill>
+        <p:spPr>
+          <a:xfrm>
+            <a:off x="8207655" y="593576"/>
+            <a:ext cx="2188870" cy="2188870"/>
+          </a:xfrm>
+          <a:prstGeom prst="rect">
+            <a:avLst/>
+          </a:prstGeom>
+        </p:spPr>
+      </p:pic>
     </p:spTree>
     <p:extLst>
       <p:ext uri="{BB962C8B-B14F-4D97-AF65-F5344CB8AC3E}">
-        <p14:creationId xmlns:p14="http://schemas.microsoft.com/office/powerpoint/2010/main" val="1973002747"/>
+        <p14:creationId xmlns:p14="http://schemas.microsoft.com/office/powerpoint/2010/main" val="939332245"/>
       </p:ext>
     </p:extLst>
   </p:cSld>
@@ -9233,6 +10939,24 @@
 </file>
 
 <file path=customXml/item1.xml><?xml version="1.0" encoding="utf-8"?>
+<p:properties xmlns:p="http://schemas.microsoft.com/office/2006/metadata/properties" xmlns:xsi="http://www.w3.org/2001/XMLSchema-instance" xmlns:pc="http://schemas.microsoft.com/office/infopath/2007/PartnerControls">
+  <documentManagement>
+    <Status xmlns="71af3243-3dd4-4a8d-8c0d-dd76da1f02a5">Not started</Status>
+    <MediaServiceKeyPoints xmlns="71af3243-3dd4-4a8d-8c0d-dd76da1f02a5" xsi:nil="true"/>
+  </documentManagement>
+</p:properties>
+</file>
+
+<file path=customXml/item2.xml><?xml version="1.0" encoding="utf-8"?>
+<?mso-contentType ?>
+<FormTemplates xmlns="http://schemas.microsoft.com/sharepoint/v3/contenttype/forms">
+  <Display>DocumentLibraryForm</Display>
+  <Edit>DocumentLibraryForm</Edit>
+  <New>DocumentLibraryForm</New>
+</FormTemplates>
+</file>
+
+<file path=customXml/item3.xml><?xml version="1.0" encoding="utf-8"?>
 <ct:contentTypeSchema xmlns:ct="http://schemas.microsoft.com/office/2006/metadata/contentType" xmlns:ma="http://schemas.microsoft.com/office/2006/metadata/properties/metaAttributes" ct:_="" ma:_="" ma:contentTypeName="Document" ma:contentTypeID="0x01010079F111ED35F8CC479449609E8A0923A6" ma:contentTypeVersion="12" ma:contentTypeDescription="Create a new document." ma:contentTypeScope="" ma:versionID="a410dd7f93c95333ffa1b60ed6adedd1">
   <xsd:schema xmlns:xsd="http://www.w3.org/2001/XMLSchema" xmlns:xs="http://www.w3.org/2001/XMLSchema" xmlns:p="http://schemas.microsoft.com/office/2006/metadata/properties" xmlns:ns2="71af3243-3dd4-4a8d-8c0d-dd76da1f02a5" xmlns:ns3="16c05727-aa75-4e4a-9b5f-8a80a1165891" targetNamespace="http://schemas.microsoft.com/office/2006/metadata/properties" ma:root="true" ma:fieldsID="a936d9baba76aa3866493feff160faab" ns2:_="" ns3:_="">
     <xsd:import namespace="71af3243-3dd4-4a8d-8c0d-dd76da1f02a5"/>
@@ -9453,25 +11177,25 @@
 </ct:contentTypeSchema>
 </file>
 
-<file path=customXml/item2.xml><?xml version="1.0" encoding="utf-8"?>
-<p:properties xmlns:p="http://schemas.microsoft.com/office/2006/metadata/properties" xmlns:xsi="http://www.w3.org/2001/XMLSchema-instance" xmlns:pc="http://schemas.microsoft.com/office/infopath/2007/PartnerControls">
-  <documentManagement>
-    <Status xmlns="71af3243-3dd4-4a8d-8c0d-dd76da1f02a5">Not started</Status>
-    <MediaServiceKeyPoints xmlns="71af3243-3dd4-4a8d-8c0d-dd76da1f02a5" xsi:nil="true"/>
-  </documentManagement>
-</p:properties>
+<file path=customXml/itemProps1.xml><?xml version="1.0" encoding="utf-8"?>
+<ds:datastoreItem xmlns:ds="http://schemas.openxmlformats.org/officeDocument/2006/customXml" ds:itemID="{52F3B215-496E-4790-A364-7C1C46DEC771}">
+  <ds:schemaRefs>
+    <ds:schemaRef ds:uri="http://schemas.microsoft.com/office/2006/metadata/properties"/>
+    <ds:schemaRef ds:uri="http://schemas.microsoft.com/office/infopath/2007/PartnerControls"/>
+    <ds:schemaRef ds:uri="71af3243-3dd4-4a8d-8c0d-dd76da1f02a5"/>
+  </ds:schemaRefs>
+</ds:datastoreItem>
 </file>
 
-<file path=customXml/item3.xml><?xml version="1.0" encoding="utf-8"?>
-<?mso-contentType ?>
-<FormTemplates xmlns="http://schemas.microsoft.com/sharepoint/v3/contenttype/forms">
-  <Display>DocumentLibraryForm</Display>
-  <Edit>DocumentLibraryForm</Edit>
-  <New>DocumentLibraryForm</New>
-</FormTemplates>
+<file path=customXml/itemProps2.xml><?xml version="1.0" encoding="utf-8"?>
+<ds:datastoreItem xmlns:ds="http://schemas.openxmlformats.org/officeDocument/2006/customXml" ds:itemID="{AE2713E1-6312-427E-BFCB-C5A5DA301373}">
+  <ds:schemaRefs>
+    <ds:schemaRef ds:uri="http://schemas.microsoft.com/sharepoint/v3/contenttype/forms"/>
+  </ds:schemaRefs>
+</ds:datastoreItem>
 </file>
 
-<file path=customXml/itemProps1.xml><?xml version="1.0" encoding="utf-8"?>
+<file path=customXml/itemProps3.xml><?xml version="1.0" encoding="utf-8"?>
 <ds:datastoreItem xmlns:ds="http://schemas.openxmlformats.org/officeDocument/2006/customXml" ds:itemID="{50DB95DD-0319-4EE5-8C5C-9CEDF75E024B}">
   <ds:schemaRefs>
     <ds:schemaRef ds:uri="http://schemas.microsoft.com/office/2006/metadata/contentType"/>
@@ -9488,22 +11212,4 @@
     <ds:schemaRef ds:uri="http://schemas.microsoft.com/internal/obd"/>
   </ds:schemaRefs>
 </ds:datastoreItem>
-</file>
-
-<file path=customXml/itemProps2.xml><?xml version="1.0" encoding="utf-8"?>
-<ds:datastoreItem xmlns:ds="http://schemas.openxmlformats.org/officeDocument/2006/customXml" ds:itemID="{52F3B215-496E-4790-A364-7C1C46DEC771}">
-  <ds:schemaRefs>
-    <ds:schemaRef ds:uri="http://schemas.microsoft.com/office/2006/metadata/properties"/>
-    <ds:schemaRef ds:uri="http://schemas.microsoft.com/office/infopath/2007/PartnerControls"/>
-    <ds:schemaRef ds:uri="71af3243-3dd4-4a8d-8c0d-dd76da1f02a5"/>
-  </ds:schemaRefs>
-</ds:datastoreItem>
-</file>
-
-<file path=customXml/itemProps3.xml><?xml version="1.0" encoding="utf-8"?>
-<ds:datastoreItem xmlns:ds="http://schemas.openxmlformats.org/officeDocument/2006/customXml" ds:itemID="{AE2713E1-6312-427E-BFCB-C5A5DA301373}">
-  <ds:schemaRefs>
-    <ds:schemaRef ds:uri="http://schemas.microsoft.com/sharepoint/v3/contenttype/forms"/>
-  </ds:schemaRefs>
-</ds:datastoreItem>
 </file>
</xml_diff>